<commit_message>
uppper-lower in de ppt
</commit_message>
<xml_diff>
--- a/Presentatie Slides JSMR.pptx
+++ b/Presentatie Slides JSMR.pptx
@@ -369,7 +369,7 @@
           <a:p>
             <a:fld id="{7E89BABF-119A-4ABA-81FB-ADE9A0136724}" type="slidenum">
               <a:rPr lang="nl-NL" smtClean="0"/>
-              <a:t>‹#›</a:t>
+              <a:t>‹nr.›</a:t>
             </a:fld>
             <a:endParaRPr lang="nl-NL"/>
           </a:p>
@@ -2992,7 +2992,7 @@
           <a:p>
             <a:fld id="{44C9C919-EFE0-486A-B31F-9367B30F4A27}" type="slidenum">
               <a:rPr lang="nl-NL" smtClean="0"/>
-              <a:t>‹#›</a:t>
+              <a:t>‹nr.›</a:t>
             </a:fld>
             <a:endParaRPr lang="nl-NL"/>
           </a:p>
@@ -3243,7 +3243,7 @@
           <a:p>
             <a:fld id="{44C9C919-EFE0-486A-B31F-9367B30F4A27}" type="slidenum">
               <a:rPr lang="nl-NL" smtClean="0"/>
-              <a:t>‹#›</a:t>
+              <a:t>‹nr.›</a:t>
             </a:fld>
             <a:endParaRPr lang="nl-NL"/>
           </a:p>
@@ -3557,7 +3557,7 @@
           <a:p>
             <a:fld id="{44C9C919-EFE0-486A-B31F-9367B30F4A27}" type="slidenum">
               <a:rPr lang="nl-NL" smtClean="0"/>
-              <a:t>‹#›</a:t>
+              <a:t>‹nr.›</a:t>
             </a:fld>
             <a:endParaRPr lang="nl-NL"/>
           </a:p>
@@ -3898,7 +3898,7 @@
           <a:p>
             <a:fld id="{44C9C919-EFE0-486A-B31F-9367B30F4A27}" type="slidenum">
               <a:rPr lang="nl-NL" smtClean="0"/>
-              <a:t>‹#›</a:t>
+              <a:t>‹nr.›</a:t>
             </a:fld>
             <a:endParaRPr lang="nl-NL"/>
           </a:p>
@@ -4212,7 +4212,7 @@
           <a:p>
             <a:fld id="{44C9C919-EFE0-486A-B31F-9367B30F4A27}" type="slidenum">
               <a:rPr lang="nl-NL" smtClean="0"/>
-              <a:t>‹#›</a:t>
+              <a:t>‹nr.›</a:t>
             </a:fld>
             <a:endParaRPr lang="nl-NL"/>
           </a:p>
@@ -4605,7 +4605,7 @@
           <a:p>
             <a:fld id="{44C9C919-EFE0-486A-B31F-9367B30F4A27}" type="slidenum">
               <a:rPr lang="nl-NL" smtClean="0"/>
-              <a:t>‹#›</a:t>
+              <a:t>‹nr.›</a:t>
             </a:fld>
             <a:endParaRPr lang="nl-NL"/>
           </a:p>
@@ -4775,7 +4775,7 @@
           <a:p>
             <a:fld id="{44C9C919-EFE0-486A-B31F-9367B30F4A27}" type="slidenum">
               <a:rPr lang="nl-NL" smtClean="0"/>
-              <a:t>‹#›</a:t>
+              <a:t>‹nr.›</a:t>
             </a:fld>
             <a:endParaRPr lang="nl-NL"/>
           </a:p>
@@ -4955,7 +4955,7 @@
           <a:p>
             <a:fld id="{44C9C919-EFE0-486A-B31F-9367B30F4A27}" type="slidenum">
               <a:rPr lang="nl-NL" smtClean="0"/>
-              <a:t>‹#›</a:t>
+              <a:t>‹nr.›</a:t>
             </a:fld>
             <a:endParaRPr lang="nl-NL"/>
           </a:p>
@@ -5131,7 +5131,7 @@
           <a:p>
             <a:fld id="{44C9C919-EFE0-486A-B31F-9367B30F4A27}" type="slidenum">
               <a:rPr lang="nl-NL" smtClean="0"/>
-              <a:t>‹#›</a:t>
+              <a:t>‹nr.›</a:t>
             </a:fld>
             <a:endParaRPr lang="nl-NL"/>
           </a:p>
@@ -5378,7 +5378,7 @@
           <a:p>
             <a:fld id="{44C9C919-EFE0-486A-B31F-9367B30F4A27}" type="slidenum">
               <a:rPr lang="nl-NL" smtClean="0"/>
-              <a:t>‹#›</a:t>
+              <a:t>‹nr.›</a:t>
             </a:fld>
             <a:endParaRPr lang="nl-NL"/>
           </a:p>
@@ -5610,7 +5610,7 @@
           <a:p>
             <a:fld id="{44C9C919-EFE0-486A-B31F-9367B30F4A27}" type="slidenum">
               <a:rPr lang="nl-NL" smtClean="0"/>
-              <a:t>‹#›</a:t>
+              <a:t>‹nr.›</a:t>
             </a:fld>
             <a:endParaRPr lang="nl-NL"/>
           </a:p>
@@ -5984,7 +5984,7 @@
           <a:p>
             <a:fld id="{44C9C919-EFE0-486A-B31F-9367B30F4A27}" type="slidenum">
               <a:rPr lang="nl-NL" smtClean="0"/>
-              <a:t>‹#›</a:t>
+              <a:t>‹nr.›</a:t>
             </a:fld>
             <a:endParaRPr lang="nl-NL"/>
           </a:p>
@@ -6107,7 +6107,7 @@
           <a:p>
             <a:fld id="{44C9C919-EFE0-486A-B31F-9367B30F4A27}" type="slidenum">
               <a:rPr lang="nl-NL" smtClean="0"/>
-              <a:t>‹#›</a:t>
+              <a:t>‹nr.›</a:t>
             </a:fld>
             <a:endParaRPr lang="nl-NL"/>
           </a:p>
@@ -6202,7 +6202,7 @@
           <a:p>
             <a:fld id="{44C9C919-EFE0-486A-B31F-9367B30F4A27}" type="slidenum">
               <a:rPr lang="nl-NL" smtClean="0"/>
-              <a:t>‹#›</a:t>
+              <a:t>‹nr.›</a:t>
             </a:fld>
             <a:endParaRPr lang="nl-NL"/>
           </a:p>
@@ -6457,7 +6457,7 @@
           <a:p>
             <a:fld id="{44C9C919-EFE0-486A-B31F-9367B30F4A27}" type="slidenum">
               <a:rPr lang="nl-NL" smtClean="0"/>
-              <a:t>‹#›</a:t>
+              <a:t>‹nr.›</a:t>
             </a:fld>
             <a:endParaRPr lang="nl-NL"/>
           </a:p>
@@ -6720,7 +6720,7 @@
           <a:p>
             <a:fld id="{44C9C919-EFE0-486A-B31F-9367B30F4A27}" type="slidenum">
               <a:rPr lang="nl-NL" smtClean="0"/>
-              <a:t>‹#›</a:t>
+              <a:t>‹nr.›</a:t>
             </a:fld>
             <a:endParaRPr lang="nl-NL"/>
           </a:p>
@@ -7497,7 +7497,7 @@
           <a:p>
             <a:fld id="{44C9C919-EFE0-486A-B31F-9367B30F4A27}" type="slidenum">
               <a:rPr lang="nl-NL" smtClean="0"/>
-              <a:t>‹#›</a:t>
+              <a:t>‹nr.›</a:t>
             </a:fld>
             <a:endParaRPr lang="nl-NL"/>
           </a:p>
@@ -12434,28 +12434,146 @@
           </a:p>
         </p:txBody>
       </p:sp>
-      <p:sp>
-        <p:nvSpPr>
-          <p:cNvPr id="3" name="Content Placeholder 2">
+      <p:pic>
+        <p:nvPicPr>
+          <p:cNvPr id="5" name="Tijdelijke aanduiding voor inhoud 4">
             <a:extLst>
               <a:ext uri="{FF2B5EF4-FFF2-40B4-BE49-F238E27FC236}">
-                <a16:creationId xmlns:a16="http://schemas.microsoft.com/office/drawing/2014/main" id="{387BF5F0-109F-477C-A4FC-74D5CF4E04B9}"/>
+                <a16:creationId xmlns:a16="http://schemas.microsoft.com/office/drawing/2014/main" id="{9698238B-20E1-4A3F-8E5F-D60C972E0747}"/>
               </a:ext>
             </a:extLst>
           </p:cNvPr>
-          <p:cNvSpPr>
-            <a:spLocks noGrp="1"/>
-          </p:cNvSpPr>
+          <p:cNvPicPr>
+            <a:picLocks noGrp="1" noChangeAspect="1"/>
+          </p:cNvPicPr>
           <p:nvPr>
             <p:ph idx="1"/>
           </p:nvPr>
-        </p:nvSpPr>
-        <p:spPr/>
-        <p:txBody>
-          <a:bodyPr/>
+        </p:nvPicPr>
+        <p:blipFill rotWithShape="1">
+          <a:blip r:embed="rId2">
+            <a:extLst>
+              <a:ext uri="{28A0092B-C50C-407E-A947-70E740481C1C}">
+                <a14:useLocalDpi xmlns:a14="http://schemas.microsoft.com/office/drawing/2010/main" val="0"/>
+              </a:ext>
+            </a:extLst>
+          </a:blip>
+          <a:srcRect l="7491" t="10298" r="6037" b="6001"/>
+          <a:stretch/>
+        </p:blipFill>
+        <p:spPr>
+          <a:xfrm>
+            <a:off x="6096000" y="1670488"/>
+            <a:ext cx="5141081" cy="3732227"/>
+          </a:xfrm>
+        </p:spPr>
+      </p:pic>
+      <p:pic>
+        <p:nvPicPr>
+          <p:cNvPr id="7" name="Afbeelding 6">
+            <a:extLst>
+              <a:ext uri="{FF2B5EF4-FFF2-40B4-BE49-F238E27FC236}">
+                <a16:creationId xmlns:a16="http://schemas.microsoft.com/office/drawing/2014/main" id="{0109E1FC-8900-4706-9E01-A184EA1EBABD}"/>
+              </a:ext>
+            </a:extLst>
+          </p:cNvPr>
+          <p:cNvPicPr>
+            <a:picLocks noChangeAspect="1"/>
+          </p:cNvPicPr>
+          <p:nvPr/>
+        </p:nvPicPr>
+        <p:blipFill rotWithShape="1">
+          <a:blip r:embed="rId3">
+            <a:extLst>
+              <a:ext uri="{28A0092B-C50C-407E-A947-70E740481C1C}">
+                <a14:useLocalDpi xmlns:a14="http://schemas.microsoft.com/office/drawing/2010/main" val="0"/>
+              </a:ext>
+            </a:extLst>
+          </a:blip>
+          <a:srcRect l="8326" t="9337" r="8272" b="5331"/>
+          <a:stretch/>
+        </p:blipFill>
+        <p:spPr>
+          <a:xfrm>
+            <a:off x="946256" y="1657355"/>
+            <a:ext cx="4880822" cy="3745360"/>
+          </a:xfrm>
+          <a:prstGeom prst="rect">
+            <a:avLst/>
+          </a:prstGeom>
+        </p:spPr>
+      </p:pic>
+      <p:sp>
+        <p:nvSpPr>
+          <p:cNvPr id="8" name="Tekstvak 7">
+            <a:extLst>
+              <a:ext uri="{FF2B5EF4-FFF2-40B4-BE49-F238E27FC236}">
+                <a16:creationId xmlns:a16="http://schemas.microsoft.com/office/drawing/2014/main" id="{87455892-FDFC-4561-9EF5-84A39D95286E}"/>
+              </a:ext>
+            </a:extLst>
+          </p:cNvPr>
+          <p:cNvSpPr txBox="1"/>
+          <p:nvPr/>
+        </p:nvSpPr>
+        <p:spPr>
+          <a:xfrm>
+            <a:off x="1407260" y="5454127"/>
+            <a:ext cx="3958814" cy="369332"/>
+          </a:xfrm>
+          <a:prstGeom prst="rect">
+            <a:avLst/>
+          </a:prstGeom>
+          <a:noFill/>
+        </p:spPr>
+        <p:txBody>
+          <a:bodyPr wrap="square" rtlCol="0">
+            <a:spAutoFit/>
+          </a:bodyPr>
           <a:lstStyle/>
           <a:p>
-            <a:endParaRPr lang="nl-NL"/>
+            <a:pPr algn="ctr"/>
+            <a:r>
+              <a:rPr lang="en-US" dirty="0"/>
+              <a:t>Absolute lower bound</a:t>
+            </a:r>
+            <a:endParaRPr lang="en-GB" dirty="0"/>
+          </a:p>
+        </p:txBody>
+      </p:sp>
+      <p:sp>
+        <p:nvSpPr>
+          <p:cNvPr id="9" name="Tekstvak 8">
+            <a:extLst>
+              <a:ext uri="{FF2B5EF4-FFF2-40B4-BE49-F238E27FC236}">
+                <a16:creationId xmlns:a16="http://schemas.microsoft.com/office/drawing/2014/main" id="{4F4FD6A7-A475-486F-8B78-98357E1E9143}"/>
+              </a:ext>
+            </a:extLst>
+          </p:cNvPr>
+          <p:cNvSpPr txBox="1"/>
+          <p:nvPr/>
+        </p:nvSpPr>
+        <p:spPr>
+          <a:xfrm>
+            <a:off x="6687133" y="5454127"/>
+            <a:ext cx="3958814" cy="369332"/>
+          </a:xfrm>
+          <a:prstGeom prst="rect">
+            <a:avLst/>
+          </a:prstGeom>
+          <a:noFill/>
+        </p:spPr>
+        <p:txBody>
+          <a:bodyPr wrap="square" rtlCol="0">
+            <a:spAutoFit/>
+          </a:bodyPr>
+          <a:lstStyle/>
+          <a:p>
+            <a:pPr algn="ctr"/>
+            <a:r>
+              <a:rPr lang="en-US" dirty="0"/>
+              <a:t>Absolute upper bound</a:t>
+            </a:r>
+            <a:endParaRPr lang="en-GB" dirty="0"/>
           </a:p>
         </p:txBody>
       </p:sp>

</xml_diff>